<commit_message>
Update Lecture 02 - Image Filtering.pptx
</commit_message>
<xml_diff>
--- a/ComputerVision/Lecture 02 - Image Filtering/Lecture 02 - Image Filtering.pptx
+++ b/ComputerVision/Lecture 02 - Image Filtering/Lecture 02 - Image Filtering.pptx
@@ -342,13 +342,13 @@
         <pc:chgData name="Andre Gustavo Hochuli" userId="03e47721-5546-461c-8dc6-d9f4fc638cac" providerId="ADAL" clId="{D3503B14-B72F-4545-8E19-219A304BE0C6}" dt="2022-08-02T10:00:48.754" v="1106"/>
         <pc:sldMkLst>
           <pc:docMk/>
-          <pc:sldMk cId="0" sldId="260"/>
+          <pc:sldMk cId="2855356280" sldId="260"/>
         </pc:sldMkLst>
         <pc:spChg chg="add mod">
           <ac:chgData name="Andre Gustavo Hochuli" userId="03e47721-5546-461c-8dc6-d9f4fc638cac" providerId="ADAL" clId="{D3503B14-B72F-4545-8E19-219A304BE0C6}" dt="2022-08-02T10:00:48.754" v="1106"/>
           <ac:spMkLst>
             <pc:docMk/>
-            <pc:sldMk cId="0" sldId="260"/>
+            <pc:sldMk cId="2855356280" sldId="260"/>
             <ac:spMk id="8" creationId="{D212725E-6978-106C-3DC2-9274B63ADD8C}"/>
           </ac:spMkLst>
         </pc:spChg>
@@ -356,7 +356,7 @@
           <ac:chgData name="Andre Gustavo Hochuli" userId="03e47721-5546-461c-8dc6-d9f4fc638cac" providerId="ADAL" clId="{D3503B14-B72F-4545-8E19-219A304BE0C6}" dt="2022-08-02T10:00:48.754" v="1106"/>
           <ac:spMkLst>
             <pc:docMk/>
-            <pc:sldMk cId="0" sldId="260"/>
+            <pc:sldMk cId="2855356280" sldId="260"/>
             <ac:spMk id="9" creationId="{45B2F7AF-4D1C-E634-0ADB-3CFA83E72C96}"/>
           </ac:spMkLst>
         </pc:spChg>
@@ -364,7 +364,7 @@
           <ac:chgData name="Andre Gustavo Hochuli" userId="03e47721-5546-461c-8dc6-d9f4fc638cac" providerId="ADAL" clId="{D3503B14-B72F-4545-8E19-219A304BE0C6}" dt="2022-08-02T10:00:45.514" v="1104" actId="478"/>
           <ac:spMkLst>
             <pc:docMk/>
-            <pc:sldMk cId="0" sldId="260"/>
+            <pc:sldMk cId="2855356280" sldId="260"/>
             <ac:spMk id="105" creationId="{00000000-0000-0000-0000-000000000000}"/>
           </ac:spMkLst>
         </pc:spChg>
@@ -372,7 +372,7 @@
           <ac:chgData name="Andre Gustavo Hochuli" userId="03e47721-5546-461c-8dc6-d9f4fc638cac" providerId="ADAL" clId="{D3503B14-B72F-4545-8E19-219A304BE0C6}" dt="2022-08-02T10:00:48.259" v="1105" actId="478"/>
           <ac:spMkLst>
             <pc:docMk/>
-            <pc:sldMk cId="0" sldId="260"/>
+            <pc:sldMk cId="2855356280" sldId="260"/>
             <ac:spMk id="106" creationId="{00000000-0000-0000-0000-000000000000}"/>
           </ac:spMkLst>
         </pc:spChg>
@@ -381,13 +381,13 @@
         <pc:chgData name="Andre Gustavo Hochuli" userId="03e47721-5546-461c-8dc6-d9f4fc638cac" providerId="ADAL" clId="{D3503B14-B72F-4545-8E19-219A304BE0C6}" dt="2022-08-02T10:00:54.701" v="1108"/>
         <pc:sldMkLst>
           <pc:docMk/>
-          <pc:sldMk cId="0" sldId="261"/>
+          <pc:sldMk cId="129391775" sldId="261"/>
         </pc:sldMkLst>
         <pc:spChg chg="add mod">
           <ac:chgData name="Andre Gustavo Hochuli" userId="03e47721-5546-461c-8dc6-d9f4fc638cac" providerId="ADAL" clId="{D3503B14-B72F-4545-8E19-219A304BE0C6}" dt="2022-08-02T10:00:54.701" v="1108"/>
           <ac:spMkLst>
             <pc:docMk/>
-            <pc:sldMk cId="0" sldId="261"/>
+            <pc:sldMk cId="129391775" sldId="261"/>
             <ac:spMk id="6" creationId="{34E25838-6FA0-72C1-5637-FE235A7ABB9C}"/>
           </ac:spMkLst>
         </pc:spChg>
@@ -395,7 +395,7 @@
           <ac:chgData name="Andre Gustavo Hochuli" userId="03e47721-5546-461c-8dc6-d9f4fc638cac" providerId="ADAL" clId="{D3503B14-B72F-4545-8E19-219A304BE0C6}" dt="2022-08-02T10:00:54.701" v="1108"/>
           <ac:spMkLst>
             <pc:docMk/>
-            <pc:sldMk cId="0" sldId="261"/>
+            <pc:sldMk cId="129391775" sldId="261"/>
             <ac:spMk id="7" creationId="{D6BBD8FC-7C35-3182-E0CF-8F0C7279960D}"/>
           </ac:spMkLst>
         </pc:spChg>
@@ -403,7 +403,7 @@
           <ac:chgData name="Andre Gustavo Hochuli" userId="03e47721-5546-461c-8dc6-d9f4fc638cac" providerId="ADAL" clId="{D3503B14-B72F-4545-8E19-219A304BE0C6}" dt="2022-08-02T10:00:54.291" v="1107" actId="478"/>
           <ac:spMkLst>
             <pc:docMk/>
-            <pc:sldMk cId="0" sldId="261"/>
+            <pc:sldMk cId="129391775" sldId="261"/>
             <ac:spMk id="110" creationId="{00000000-0000-0000-0000-000000000000}"/>
           </ac:spMkLst>
         </pc:spChg>
@@ -412,13 +412,13 @@
         <pc:chgData name="Andre Gustavo Hochuli" userId="03e47721-5546-461c-8dc6-d9f4fc638cac" providerId="ADAL" clId="{D3503B14-B72F-4545-8E19-219A304BE0C6}" dt="2022-08-02T10:01:03.740" v="1111"/>
         <pc:sldMkLst>
           <pc:docMk/>
-          <pc:sldMk cId="0" sldId="262"/>
+          <pc:sldMk cId="2069364982" sldId="262"/>
         </pc:sldMkLst>
         <pc:spChg chg="add mod">
           <ac:chgData name="Andre Gustavo Hochuli" userId="03e47721-5546-461c-8dc6-d9f4fc638cac" providerId="ADAL" clId="{D3503B14-B72F-4545-8E19-219A304BE0C6}" dt="2022-08-02T10:01:03.740" v="1111"/>
           <ac:spMkLst>
             <pc:docMk/>
-            <pc:sldMk cId="0" sldId="262"/>
+            <pc:sldMk cId="2069364982" sldId="262"/>
             <ac:spMk id="9" creationId="{AD3F96D6-B270-E9B4-C360-E3129CFC3FFD}"/>
           </ac:spMkLst>
         </pc:spChg>
@@ -426,7 +426,7 @@
           <ac:chgData name="Andre Gustavo Hochuli" userId="03e47721-5546-461c-8dc6-d9f4fc638cac" providerId="ADAL" clId="{D3503B14-B72F-4545-8E19-219A304BE0C6}" dt="2022-08-02T10:01:03.740" v="1111"/>
           <ac:spMkLst>
             <pc:docMk/>
-            <pc:sldMk cId="0" sldId="262"/>
+            <pc:sldMk cId="2069364982" sldId="262"/>
             <ac:spMk id="10" creationId="{25C04D3E-B4BC-DF37-4309-EAE28124C4C8}"/>
           </ac:spMkLst>
         </pc:spChg>
@@ -434,7 +434,7 @@
           <ac:chgData name="Andre Gustavo Hochuli" userId="03e47721-5546-461c-8dc6-d9f4fc638cac" providerId="ADAL" clId="{D3503B14-B72F-4545-8E19-219A304BE0C6}" dt="2022-08-02T10:01:02.574" v="1110" actId="478"/>
           <ac:spMkLst>
             <pc:docMk/>
-            <pc:sldMk cId="0" sldId="262"/>
+            <pc:sldMk cId="2069364982" sldId="262"/>
             <ac:spMk id="115" creationId="{00000000-0000-0000-0000-000000000000}"/>
           </ac:spMkLst>
         </pc:spChg>
@@ -442,7 +442,7 @@
           <ac:chgData name="Andre Gustavo Hochuli" userId="03e47721-5546-461c-8dc6-d9f4fc638cac" providerId="ADAL" clId="{D3503B14-B72F-4545-8E19-219A304BE0C6}" dt="2022-08-02T10:01:01.072" v="1109" actId="478"/>
           <ac:spMkLst>
             <pc:docMk/>
-            <pc:sldMk cId="0" sldId="262"/>
+            <pc:sldMk cId="2069364982" sldId="262"/>
             <ac:spMk id="116" creationId="{00000000-0000-0000-0000-000000000000}"/>
           </ac:spMkLst>
         </pc:spChg>
@@ -450,7 +450,7 @@
           <ac:chgData name="Andre Gustavo Hochuli" userId="03e47721-5546-461c-8dc6-d9f4fc638cac" providerId="ADAL" clId="{D3503B14-B72F-4545-8E19-219A304BE0C6}" dt="2022-08-01T17:51:03.569" v="140" actId="1076"/>
           <ac:picMkLst>
             <pc:docMk/>
-            <pc:sldMk cId="0" sldId="262"/>
+            <pc:sldMk cId="2069364982" sldId="262"/>
             <ac:picMk id="117" creationId="{00000000-0000-0000-0000-000000000000}"/>
           </ac:picMkLst>
         </pc:picChg>
@@ -459,13 +459,13 @@
         <pc:chgData name="Andre Gustavo Hochuli" userId="03e47721-5546-461c-8dc6-d9f4fc638cac" providerId="ADAL" clId="{D3503B14-B72F-4545-8E19-219A304BE0C6}" dt="2022-08-02T10:01:10.743" v="1114"/>
         <pc:sldMkLst>
           <pc:docMk/>
-          <pc:sldMk cId="0" sldId="263"/>
+          <pc:sldMk cId="1165297265" sldId="263"/>
         </pc:sldMkLst>
         <pc:spChg chg="add mod">
           <ac:chgData name="Andre Gustavo Hochuli" userId="03e47721-5546-461c-8dc6-d9f4fc638cac" providerId="ADAL" clId="{D3503B14-B72F-4545-8E19-219A304BE0C6}" dt="2022-08-02T10:01:10.743" v="1114"/>
           <ac:spMkLst>
             <pc:docMk/>
-            <pc:sldMk cId="0" sldId="263"/>
+            <pc:sldMk cId="1165297265" sldId="263"/>
             <ac:spMk id="8" creationId="{067A4880-9A2A-479C-84DF-1D162BEA0735}"/>
           </ac:spMkLst>
         </pc:spChg>
@@ -473,7 +473,7 @@
           <ac:chgData name="Andre Gustavo Hochuli" userId="03e47721-5546-461c-8dc6-d9f4fc638cac" providerId="ADAL" clId="{D3503B14-B72F-4545-8E19-219A304BE0C6}" dt="2022-08-02T10:01:10.743" v="1114"/>
           <ac:spMkLst>
             <pc:docMk/>
-            <pc:sldMk cId="0" sldId="263"/>
+            <pc:sldMk cId="1165297265" sldId="263"/>
             <ac:spMk id="9" creationId="{453DE290-2C27-AC1C-DBDA-B0B3E7D3251C}"/>
           </ac:spMkLst>
         </pc:spChg>
@@ -481,7 +481,7 @@
           <ac:chgData name="Andre Gustavo Hochuli" userId="03e47721-5546-461c-8dc6-d9f4fc638cac" providerId="ADAL" clId="{D3503B14-B72F-4545-8E19-219A304BE0C6}" dt="2022-08-01T17:48:49.861" v="119" actId="403"/>
           <ac:spMkLst>
             <pc:docMk/>
-            <pc:sldMk cId="0" sldId="263"/>
+            <pc:sldMk cId="1165297265" sldId="263"/>
             <ac:spMk id="121" creationId="{00000000-0000-0000-0000-000000000000}"/>
           </ac:spMkLst>
         </pc:spChg>
@@ -489,7 +489,7 @@
           <ac:chgData name="Andre Gustavo Hochuli" userId="03e47721-5546-461c-8dc6-d9f4fc638cac" providerId="ADAL" clId="{D3503B14-B72F-4545-8E19-219A304BE0C6}" dt="2022-08-02T10:01:08.108" v="1112" actId="478"/>
           <ac:spMkLst>
             <pc:docMk/>
-            <pc:sldMk cId="0" sldId="263"/>
+            <pc:sldMk cId="1165297265" sldId="263"/>
             <ac:spMk id="122" creationId="{00000000-0000-0000-0000-000000000000}"/>
           </ac:spMkLst>
         </pc:spChg>
@@ -497,7 +497,7 @@
           <ac:chgData name="Andre Gustavo Hochuli" userId="03e47721-5546-461c-8dc6-d9f4fc638cac" providerId="ADAL" clId="{D3503B14-B72F-4545-8E19-219A304BE0C6}" dt="2022-08-02T10:01:09.871" v="1113" actId="478"/>
           <ac:spMkLst>
             <pc:docMk/>
-            <pc:sldMk cId="0" sldId="263"/>
+            <pc:sldMk cId="1165297265" sldId="263"/>
             <ac:spMk id="123" creationId="{00000000-0000-0000-0000-000000000000}"/>
           </ac:spMkLst>
         </pc:spChg>
@@ -506,13 +506,13 @@
         <pc:chgData name="Andre Gustavo Hochuli" userId="03e47721-5546-461c-8dc6-d9f4fc638cac" providerId="ADAL" clId="{D3503B14-B72F-4545-8E19-219A304BE0C6}" dt="2022-08-02T10:01:21.356" v="1117"/>
         <pc:sldMkLst>
           <pc:docMk/>
-          <pc:sldMk cId="0" sldId="264"/>
+          <pc:sldMk cId="2825761781" sldId="264"/>
         </pc:sldMkLst>
         <pc:spChg chg="add mod">
           <ac:chgData name="Andre Gustavo Hochuli" userId="03e47721-5546-461c-8dc6-d9f4fc638cac" providerId="ADAL" clId="{D3503B14-B72F-4545-8E19-219A304BE0C6}" dt="2022-08-02T10:01:21.356" v="1117"/>
           <ac:spMkLst>
             <pc:docMk/>
-            <pc:sldMk cId="0" sldId="264"/>
+            <pc:sldMk cId="2825761781" sldId="264"/>
             <ac:spMk id="7" creationId="{8F8094B1-7CFC-95B0-39F3-0677915D3FCA}"/>
           </ac:spMkLst>
         </pc:spChg>
@@ -520,7 +520,7 @@
           <ac:chgData name="Andre Gustavo Hochuli" userId="03e47721-5546-461c-8dc6-d9f4fc638cac" providerId="ADAL" clId="{D3503B14-B72F-4545-8E19-219A304BE0C6}" dt="2022-08-02T10:01:21.356" v="1117"/>
           <ac:spMkLst>
             <pc:docMk/>
-            <pc:sldMk cId="0" sldId="264"/>
+            <pc:sldMk cId="2825761781" sldId="264"/>
             <ac:spMk id="8" creationId="{F9F5CFCC-C22D-CBCA-820A-C7FBF8FEEBD8}"/>
           </ac:spMkLst>
         </pc:spChg>
@@ -528,7 +528,7 @@
           <ac:chgData name="Andre Gustavo Hochuli" userId="03e47721-5546-461c-8dc6-d9f4fc638cac" providerId="ADAL" clId="{D3503B14-B72F-4545-8E19-219A304BE0C6}" dt="2022-08-01T17:48:37.149" v="112" actId="403"/>
           <ac:spMkLst>
             <pc:docMk/>
-            <pc:sldMk cId="0" sldId="264"/>
+            <pc:sldMk cId="2825761781" sldId="264"/>
             <ac:spMk id="127" creationId="{00000000-0000-0000-0000-000000000000}"/>
           </ac:spMkLst>
         </pc:spChg>
@@ -536,7 +536,7 @@
           <ac:chgData name="Andre Gustavo Hochuli" userId="03e47721-5546-461c-8dc6-d9f4fc638cac" providerId="ADAL" clId="{D3503B14-B72F-4545-8E19-219A304BE0C6}" dt="2022-08-02T10:01:17.869" v="1115" actId="478"/>
           <ac:spMkLst>
             <pc:docMk/>
-            <pc:sldMk cId="0" sldId="264"/>
+            <pc:sldMk cId="2825761781" sldId="264"/>
             <ac:spMk id="128" creationId="{00000000-0000-0000-0000-000000000000}"/>
           </ac:spMkLst>
         </pc:spChg>
@@ -544,7 +544,7 @@
           <ac:chgData name="Andre Gustavo Hochuli" userId="03e47721-5546-461c-8dc6-d9f4fc638cac" providerId="ADAL" clId="{D3503B14-B72F-4545-8E19-219A304BE0C6}" dt="2022-08-02T10:01:20.450" v="1116" actId="478"/>
           <ac:spMkLst>
             <pc:docMk/>
-            <pc:sldMk cId="0" sldId="264"/>
+            <pc:sldMk cId="2825761781" sldId="264"/>
             <ac:spMk id="129" creationId="{00000000-0000-0000-0000-000000000000}"/>
           </ac:spMkLst>
         </pc:spChg>
@@ -552,7 +552,7 @@
           <ac:chgData name="Andre Gustavo Hochuli" userId="03e47721-5546-461c-8dc6-d9f4fc638cac" providerId="ADAL" clId="{D3503B14-B72F-4545-8E19-219A304BE0C6}" dt="2022-08-01T17:51:18.626" v="142" actId="14100"/>
           <ac:picMkLst>
             <pc:docMk/>
-            <pc:sldMk cId="0" sldId="264"/>
+            <pc:sldMk cId="2825761781" sldId="264"/>
             <ac:picMk id="130" creationId="{00000000-0000-0000-0000-000000000000}"/>
           </ac:picMkLst>
         </pc:picChg>
@@ -561,13 +561,13 @@
         <pc:chgData name="Andre Gustavo Hochuli" userId="03e47721-5546-461c-8dc6-d9f4fc638cac" providerId="ADAL" clId="{D3503B14-B72F-4545-8E19-219A304BE0C6}" dt="2022-08-02T10:01:30.772" v="1120"/>
         <pc:sldMkLst>
           <pc:docMk/>
-          <pc:sldMk cId="0" sldId="265"/>
+          <pc:sldMk cId="3679542106" sldId="265"/>
         </pc:sldMkLst>
         <pc:spChg chg="add mod">
           <ac:chgData name="Andre Gustavo Hochuli" userId="03e47721-5546-461c-8dc6-d9f4fc638cac" providerId="ADAL" clId="{D3503B14-B72F-4545-8E19-219A304BE0C6}" dt="2022-08-02T10:01:30.772" v="1120"/>
           <ac:spMkLst>
             <pc:docMk/>
-            <pc:sldMk cId="0" sldId="265"/>
+            <pc:sldMk cId="3679542106" sldId="265"/>
             <ac:spMk id="11" creationId="{EEC11559-7D41-105D-E8BB-399466F507B3}"/>
           </ac:spMkLst>
         </pc:spChg>
@@ -575,7 +575,7 @@
           <ac:chgData name="Andre Gustavo Hochuli" userId="03e47721-5546-461c-8dc6-d9f4fc638cac" providerId="ADAL" clId="{D3503B14-B72F-4545-8E19-219A304BE0C6}" dt="2022-08-02T10:01:30.772" v="1120"/>
           <ac:spMkLst>
             <pc:docMk/>
-            <pc:sldMk cId="0" sldId="265"/>
+            <pc:sldMk cId="3679542106" sldId="265"/>
             <ac:spMk id="12" creationId="{69981A3E-6491-87E6-D008-FC95EF9D6E94}"/>
           </ac:spMkLst>
         </pc:spChg>
@@ -583,7 +583,7 @@
           <ac:chgData name="Andre Gustavo Hochuli" userId="03e47721-5546-461c-8dc6-d9f4fc638cac" providerId="ADAL" clId="{D3503B14-B72F-4545-8E19-219A304BE0C6}" dt="2022-08-01T17:48:26.637" v="102" actId="20577"/>
           <ac:spMkLst>
             <pc:docMk/>
-            <pc:sldMk cId="0" sldId="265"/>
+            <pc:sldMk cId="3679542106" sldId="265"/>
             <ac:spMk id="132" creationId="{00000000-0000-0000-0000-000000000000}"/>
           </ac:spMkLst>
         </pc:spChg>
@@ -591,7 +591,7 @@
           <ac:chgData name="Andre Gustavo Hochuli" userId="03e47721-5546-461c-8dc6-d9f4fc638cac" providerId="ADAL" clId="{D3503B14-B72F-4545-8E19-219A304BE0C6}" dt="2022-08-02T10:01:28.558" v="1118" actId="478"/>
           <ac:spMkLst>
             <pc:docMk/>
-            <pc:sldMk cId="0" sldId="265"/>
+            <pc:sldMk cId="3679542106" sldId="265"/>
             <ac:spMk id="133" creationId="{00000000-0000-0000-0000-000000000000}"/>
           </ac:spMkLst>
         </pc:spChg>
@@ -599,7 +599,7 @@
           <ac:chgData name="Andre Gustavo Hochuli" userId="03e47721-5546-461c-8dc6-d9f4fc638cac" providerId="ADAL" clId="{D3503B14-B72F-4545-8E19-219A304BE0C6}" dt="2022-08-02T10:01:29.526" v="1119" actId="478"/>
           <ac:spMkLst>
             <pc:docMk/>
-            <pc:sldMk cId="0" sldId="265"/>
+            <pc:sldMk cId="3679542106" sldId="265"/>
             <ac:spMk id="134" creationId="{00000000-0000-0000-0000-000000000000}"/>
           </ac:spMkLst>
         </pc:spChg>
@@ -7139,6 +7139,26 @@
                 <a:latin typeface="Latin Modern Sans"/>
                 <a:ea typeface="DejaVu Sans"/>
               </a:rPr>
+              <a:t>Lecture</a:t>
+            </a:r>
+            <a:r>
+              <a:rPr lang="pt-BR" sz="3200" b="1" strike="noStrike" spc="-1" dirty="0">
+                <a:solidFill>
+                  <a:srgbClr val="FFFFFF"/>
+                </a:solidFill>
+                <a:latin typeface="Latin Modern Sans"/>
+                <a:ea typeface="DejaVu Sans"/>
+              </a:rPr>
+              <a:t> 02 - </a:t>
+            </a:r>
+            <a:r>
+              <a:rPr lang="pt-BR" sz="3200" b="1" strike="noStrike" spc="-1" dirty="0" err="1">
+                <a:solidFill>
+                  <a:srgbClr val="FFFFFF"/>
+                </a:solidFill>
+                <a:latin typeface="Latin Modern Sans"/>
+                <a:ea typeface="DejaVu Sans"/>
+              </a:rPr>
               <a:t>Image</a:t>
             </a:r>
             <a:r>
@@ -7649,7 +7669,7 @@
                 <a:latin typeface="Arial"/>
                 <a:ea typeface="DejaVu Sans"/>
               </a:rPr>
-              <a:t> 01</a:t>
+              <a:t> 02</a:t>
             </a:r>
             <a:endParaRPr lang="pt-BR" sz="1800" b="0" strike="noStrike" spc="-1" dirty="0">
               <a:latin typeface="Arial"/>
@@ -7883,7 +7903,17 @@
                 <a:latin typeface="Arial"/>
                 <a:ea typeface="DejaVu Sans"/>
               </a:rPr>
-              <a:t> 01</a:t>
+              <a:t> </a:t>
+            </a:r>
+            <a:r>
+              <a:rPr lang="pt-BR" spc="-1" dirty="0">
+                <a:solidFill>
+                  <a:srgbClr val="000000"/>
+                </a:solidFill>
+                <a:latin typeface="Arial"/>
+                <a:ea typeface="DejaVu Sans"/>
+              </a:rPr>
+              <a:t>02</a:t>
             </a:r>
             <a:endParaRPr lang="pt-BR" sz="1800" b="0" strike="noStrike" spc="-1" dirty="0">
               <a:latin typeface="Arial"/>
@@ -8668,7 +8698,7 @@
                 <a:latin typeface="Arial"/>
                 <a:ea typeface="DejaVu Sans"/>
               </a:rPr>
-              <a:t> 01</a:t>
+              <a:t> 02</a:t>
             </a:r>
             <a:endParaRPr lang="pt-BR" sz="1800" b="0" strike="noStrike" spc="-1" dirty="0">
               <a:latin typeface="Arial"/>
@@ -9076,7 +9106,7 @@
                 <a:latin typeface="Arial"/>
                 <a:ea typeface="DejaVu Sans"/>
               </a:rPr>
-              <a:t> 01</a:t>
+              <a:t> 02</a:t>
             </a:r>
             <a:endParaRPr lang="pt-BR" sz="1800" b="0" strike="noStrike" spc="-1" dirty="0">
               <a:latin typeface="Arial"/>
@@ -9497,7 +9527,7 @@
                 <a:latin typeface="Arial"/>
                 <a:ea typeface="DejaVu Sans"/>
               </a:rPr>
-              <a:t> 01</a:t>
+              <a:t> 02</a:t>
             </a:r>
             <a:endParaRPr lang="pt-BR" sz="1800" b="0" strike="noStrike" spc="-1" dirty="0">
               <a:latin typeface="Arial"/>
@@ -9886,7 +9916,7 @@
                 <a:latin typeface="Arial"/>
                 <a:ea typeface="DejaVu Sans"/>
               </a:rPr>
-              <a:t> 01</a:t>
+              <a:t> 02</a:t>
             </a:r>
             <a:endParaRPr lang="pt-BR" sz="1800" b="0" strike="noStrike" spc="-1" dirty="0">
               <a:latin typeface="Arial"/>
@@ -10305,7 +10335,7 @@
                 <a:latin typeface="Arial"/>
                 <a:ea typeface="DejaVu Sans"/>
               </a:rPr>
-              <a:t> 01</a:t>
+              <a:t> 02</a:t>
             </a:r>
             <a:endParaRPr lang="pt-BR" sz="1800" b="0" strike="noStrike" spc="-1" dirty="0">
               <a:latin typeface="Arial"/>
@@ -10709,7 +10739,7 @@
                 <a:latin typeface="Arial"/>
                 <a:ea typeface="DejaVu Sans"/>
               </a:rPr>
-              <a:t> 01</a:t>
+              <a:t> 02</a:t>
             </a:r>
             <a:endParaRPr lang="pt-BR" sz="1800" b="0" strike="noStrike" spc="-1" dirty="0">
               <a:latin typeface="Arial"/>
@@ -11113,7 +11143,17 @@
                 <a:latin typeface="Arial"/>
                 <a:ea typeface="DejaVu Sans"/>
               </a:rPr>
-              <a:t> 01</a:t>
+              <a:t> </a:t>
+            </a:r>
+            <a:r>
+              <a:rPr lang="pt-BR" spc="-1" dirty="0">
+                <a:solidFill>
+                  <a:srgbClr val="000000"/>
+                </a:solidFill>
+                <a:latin typeface="Arial"/>
+                <a:ea typeface="DejaVu Sans"/>
+              </a:rPr>
+              <a:t>02</a:t>
             </a:r>
             <a:endParaRPr lang="pt-BR" sz="1800" b="0" strike="noStrike" spc="-1" dirty="0">
               <a:latin typeface="Arial"/>

</xml_diff>